<commit_message>
update on Module 1
</commit_message>
<xml_diff>
--- a/Slides/Module 1 -Getting Started With JavaScript.pptx
+++ b/Slides/Module 1 -Getting Started With JavaScript.pptx
@@ -315,7 +315,7 @@
           <a:p>
             <a:fld id="{312E7B4A-039C-48A2-9B2C-AF16AA3873D8}" type="datetimeFigureOut">
               <a:rPr lang="en-US" smtClean="0"/>
-              <a:t>10/20/15</a:t>
+              <a:t>10/23/2015</a:t>
             </a:fld>
             <a:endParaRPr lang="en-US"/>
           </a:p>
@@ -480,7 +480,7 @@
           <a:p>
             <a:fld id="{DA005A0C-54D9-45AA-87D4-C551D08DFCE1}" type="datetimeFigureOut">
               <a:rPr lang="en-US" smtClean="0"/>
-              <a:t>10/20/15</a:t>
+              <a:t>10/23/2015</a:t>
             </a:fld>
             <a:endParaRPr lang="en-US"/>
           </a:p>
@@ -838,6 +838,98 @@
 </p:notes>
 </file>
 
+<file path=ppt/notesSlides/notesSlide10.xml><?xml version="1.0" encoding="utf-8"?>
+<p:notes xmlns:a="http://schemas.openxmlformats.org/drawingml/2006/main" xmlns:r="http://schemas.openxmlformats.org/officeDocument/2006/relationships" xmlns:p="http://schemas.openxmlformats.org/presentationml/2006/main">
+  <p:cSld>
+    <p:spTree>
+      <p:nvGrpSpPr>
+        <p:cNvPr id="1" name=""/>
+        <p:cNvGrpSpPr/>
+        <p:nvPr/>
+      </p:nvGrpSpPr>
+      <p:grpSpPr>
+        <a:xfrm>
+          <a:off x="0" y="0"/>
+          <a:ext cx="0" cy="0"/>
+          <a:chOff x="0" y="0"/>
+          <a:chExt cx="0" cy="0"/>
+        </a:xfrm>
+      </p:grpSpPr>
+      <p:sp>
+        <p:nvSpPr>
+          <p:cNvPr id="2" name="Slide Image Placeholder 1"/>
+          <p:cNvSpPr>
+            <a:spLocks noGrp="1" noRot="1" noChangeAspect="1"/>
+          </p:cNvSpPr>
+          <p:nvPr>
+            <p:ph type="sldImg"/>
+          </p:nvPr>
+        </p:nvSpPr>
+        <p:spPr/>
+      </p:sp>
+      <p:sp>
+        <p:nvSpPr>
+          <p:cNvPr id="3" name="Notes Placeholder 2"/>
+          <p:cNvSpPr>
+            <a:spLocks noGrp="1"/>
+          </p:cNvSpPr>
+          <p:nvPr>
+            <p:ph type="body" idx="1"/>
+          </p:nvPr>
+        </p:nvSpPr>
+        <p:spPr/>
+        <p:txBody>
+          <a:bodyPr>
+            <a:noAutofit/>
+          </a:bodyPr>
+          <a:lstStyle/>
+          <a:p>
+            <a:endParaRPr lang="en-GB" dirty="0">
+              <a:solidFill>
+                <a:schemeClr val="tx2"/>
+              </a:solidFill>
+              <a:latin typeface="Segoe" pitchFamily="34" charset="0"/>
+            </a:endParaRPr>
+          </a:p>
+        </p:txBody>
+      </p:sp>
+      <p:sp>
+        <p:nvSpPr>
+          <p:cNvPr id="4" name="Slide Number Placeholder 3"/>
+          <p:cNvSpPr>
+            <a:spLocks noGrp="1"/>
+          </p:cNvSpPr>
+          <p:nvPr>
+            <p:ph type="sldNum" sz="quarter" idx="10"/>
+          </p:nvPr>
+        </p:nvSpPr>
+        <p:spPr/>
+        <p:txBody>
+          <a:bodyPr/>
+          <a:lstStyle/>
+          <a:p>
+            <a:fld id="{13F0F35F-DD44-4607-AEC1-49D7A4BC4066}" type="slidenum">
+              <a:rPr lang="en-US" smtClean="0"/>
+              <a:pPr/>
+              <a:t>33</a:t>
+            </a:fld>
+            <a:endParaRPr lang="en-US" dirty="0"/>
+          </a:p>
+        </p:txBody>
+      </p:sp>
+    </p:spTree>
+    <p:extLst>
+      <p:ext uri="{BB962C8B-B14F-4D97-AF65-F5344CB8AC3E}">
+        <p14:creationId xmlns:p14="http://schemas.microsoft.com/office/powerpoint/2010/main" val="3328470092"/>
+      </p:ext>
+    </p:extLst>
+  </p:cSld>
+  <p:clrMapOvr>
+    <a:masterClrMapping/>
+  </p:clrMapOvr>
+</p:notes>
+</file>
+
 <file path=ppt/notesSlides/notesSlide2.xml><?xml version="1.0" encoding="utf-8"?>
 <p:notes xmlns:a="http://schemas.openxmlformats.org/drawingml/2006/main" xmlns:r="http://schemas.openxmlformats.org/officeDocument/2006/relationships" xmlns:p="http://schemas.openxmlformats.org/presentationml/2006/main">
   <p:cSld>
@@ -1319,6 +1411,27 @@
           <a:bodyPr/>
           <a:lstStyle/>
           <a:p>
+            <a:r>
+              <a:rPr lang="en-US" dirty="0" smtClean="0"/>
+              <a:t>So.. I will be presenting</a:t>
+            </a:r>
+            <a:r>
+              <a:rPr lang="en-US" baseline="0" dirty="0" smtClean="0"/>
+              <a:t> my demos in command line and running everything with node</a:t>
+            </a:r>
+          </a:p>
+          <a:p>
+            <a:endParaRPr lang="en-US" baseline="0" dirty="0" smtClean="0"/>
+          </a:p>
+          <a:p>
+            <a:r>
+              <a:rPr lang="en-US" baseline="0" dirty="0" smtClean="0"/>
+              <a:t>If you don’t know what node is… it is pretty much a server that executes JavaScript and runs really fast. It allows back end developers to code in JS and is very good with I/O heavy apps… I don’t want to touch too much into it.. But if you want more info and some guidance.. Check out my blog! I just made a new post that will explain things a bit better and get you started if you </a:t>
+            </a:r>
+            <a:r>
+              <a:rPr lang="en-US" baseline="0" smtClean="0"/>
+              <a:t>are interested</a:t>
+            </a:r>
             <a:endParaRPr lang="en-US" dirty="0"/>
           </a:p>
         </p:txBody>
@@ -1340,7 +1453,7 @@
           <a:p>
             <a:fld id="{4CFD207A-07DF-40AD-A916-9872E089CE7A}" type="slidenum">
               <a:rPr lang="en-US" smtClean="0"/>
-              <a:t>16</a:t>
+              <a:t>14</a:t>
             </a:fld>
             <a:endParaRPr lang="en-US"/>
           </a:p>
@@ -1349,7 +1462,7 @@
     </p:spTree>
     <p:extLst>
       <p:ext uri="{BB962C8B-B14F-4D97-AF65-F5344CB8AC3E}">
-        <p14:creationId xmlns:p14="http://schemas.microsoft.com/office/powerpoint/2010/main" val="2233758877"/>
+        <p14:creationId xmlns:p14="http://schemas.microsoft.com/office/powerpoint/2010/main" val="1180973977"/>
       </p:ext>
     </p:extLst>
   </p:cSld>
@@ -1403,30 +1516,6 @@
           <a:bodyPr/>
           <a:lstStyle/>
           <a:p>
-            <a:r>
-              <a:rPr lang="en-US" dirty="0" smtClean="0"/>
-              <a:t>Steps:</a:t>
-            </a:r>
-          </a:p>
-          <a:p>
-            <a:endParaRPr lang="en-US" dirty="0" smtClean="0"/>
-          </a:p>
-          <a:p>
-            <a:r>
-              <a:rPr lang="en-US" baseline="0" dirty="0" err="1" smtClean="0"/>
-              <a:t>npm</a:t>
-            </a:r>
-            <a:r>
-              <a:rPr lang="en-US" baseline="0" dirty="0" smtClean="0"/>
-              <a:t> </a:t>
-            </a:r>
-            <a:r>
-              <a:rPr lang="en-US" baseline="0" dirty="0" err="1" smtClean="0"/>
-              <a:t>init</a:t>
-            </a:r>
-            <a:endParaRPr lang="en-US" baseline="0" dirty="0" smtClean="0"/>
-          </a:p>
-          <a:p>
             <a:endParaRPr lang="en-US" dirty="0"/>
           </a:p>
         </p:txBody>
@@ -1448,7 +1537,7 @@
           <a:p>
             <a:fld id="{4CFD207A-07DF-40AD-A916-9872E089CE7A}" type="slidenum">
               <a:rPr lang="en-US" smtClean="0"/>
-              <a:t>19</a:t>
+              <a:t>16</a:t>
             </a:fld>
             <a:endParaRPr lang="en-US"/>
           </a:p>
@@ -1457,7 +1546,7 @@
     </p:spTree>
     <p:extLst>
       <p:ext uri="{BB962C8B-B14F-4D97-AF65-F5344CB8AC3E}">
-        <p14:creationId xmlns:p14="http://schemas.microsoft.com/office/powerpoint/2010/main" val="3295802257"/>
+        <p14:creationId xmlns:p14="http://schemas.microsoft.com/office/powerpoint/2010/main" val="2233758877"/>
       </p:ext>
     </p:extLst>
   </p:cSld>
@@ -1508,17 +1597,34 @@
         </p:nvSpPr>
         <p:spPr/>
         <p:txBody>
-          <a:bodyPr>
-            <a:noAutofit/>
-          </a:bodyPr>
+          <a:bodyPr/>
           <a:lstStyle/>
           <a:p>
-            <a:endParaRPr lang="en-GB" dirty="0">
-              <a:solidFill>
-                <a:schemeClr val="tx2"/>
-              </a:solidFill>
-              <a:latin typeface="Segoe" pitchFamily="34" charset="0"/>
-            </a:endParaRPr>
+            <a:r>
+              <a:rPr lang="en-US" dirty="0" smtClean="0"/>
+              <a:t>Steps:</a:t>
+            </a:r>
+          </a:p>
+          <a:p>
+            <a:endParaRPr lang="en-US" dirty="0" smtClean="0"/>
+          </a:p>
+          <a:p>
+            <a:r>
+              <a:rPr lang="en-US" baseline="0" dirty="0" err="1" smtClean="0"/>
+              <a:t>npm</a:t>
+            </a:r>
+            <a:r>
+              <a:rPr lang="en-US" baseline="0" dirty="0" smtClean="0"/>
+              <a:t> </a:t>
+            </a:r>
+            <a:r>
+              <a:rPr lang="en-US" baseline="0" dirty="0" err="1" smtClean="0"/>
+              <a:t>init</a:t>
+            </a:r>
+            <a:endParaRPr lang="en-US" baseline="0" dirty="0" smtClean="0"/>
+          </a:p>
+          <a:p>
+            <a:endParaRPr lang="en-US" dirty="0"/>
           </a:p>
         </p:txBody>
       </p:sp>
@@ -1537,19 +1643,18 @@
           <a:bodyPr/>
           <a:lstStyle/>
           <a:p>
-            <a:fld id="{13F0F35F-DD44-4607-AEC1-49D7A4BC4066}" type="slidenum">
+            <a:fld id="{4CFD207A-07DF-40AD-A916-9872E089CE7A}" type="slidenum">
               <a:rPr lang="en-US" smtClean="0"/>
-              <a:pPr/>
-              <a:t>33</a:t>
+              <a:t>19</a:t>
             </a:fld>
-            <a:endParaRPr lang="en-US" dirty="0"/>
+            <a:endParaRPr lang="en-US"/>
           </a:p>
         </p:txBody>
       </p:sp>
     </p:spTree>
     <p:extLst>
       <p:ext uri="{BB962C8B-B14F-4D97-AF65-F5344CB8AC3E}">
-        <p14:creationId xmlns:p14="http://schemas.microsoft.com/office/powerpoint/2010/main" val="3328470092"/>
+        <p14:creationId xmlns:p14="http://schemas.microsoft.com/office/powerpoint/2010/main" val="3295802257"/>
       </p:ext>
     </p:extLst>
   </p:cSld>
@@ -21064,14 +21169,14 @@
                 <a:gridCol w="5762625">
                   <a:extLst>
                     <a:ext uri="{9D8B030D-6E8A-4147-A177-3AD203B41FA5}">
-                      <a16:colId xmlns:a16="http://schemas.microsoft.com/office/drawing/2014/main" xmlns="" val="20000"/>
+                      <a16:colId xmlns:a16="http://schemas.microsoft.com/office/drawing/2014/main" val="20000"/>
                     </a:ext>
                   </a:extLst>
                 </a:gridCol>
                 <a:gridCol w="5762625">
                   <a:extLst>
                     <a:ext uri="{9D8B030D-6E8A-4147-A177-3AD203B41FA5}">
-                      <a16:colId xmlns:a16="http://schemas.microsoft.com/office/drawing/2014/main" xmlns="" val="20001"/>
+                      <a16:colId xmlns:a16="http://schemas.microsoft.com/office/drawing/2014/main" val="20001"/>
                     </a:ext>
                   </a:extLst>
                 </a:gridCol>
@@ -21109,7 +21214,7 @@
                 </a:tc>
                 <a:extLst>
                   <a:ext uri="{0D108BD9-81ED-4DB2-BD59-A6C34878D82A}">
-                    <a16:rowId xmlns:a16="http://schemas.microsoft.com/office/drawing/2014/main" xmlns="" val="10000"/>
+                    <a16:rowId xmlns:a16="http://schemas.microsoft.com/office/drawing/2014/main" val="10000"/>
                   </a:ext>
                 </a:extLst>
               </a:tr>
@@ -21174,7 +21279,7 @@
                 </a:tc>
                 <a:extLst>
                   <a:ext uri="{0D108BD9-81ED-4DB2-BD59-A6C34878D82A}">
-                    <a16:rowId xmlns:a16="http://schemas.microsoft.com/office/drawing/2014/main" xmlns="" val="10001"/>
+                    <a16:rowId xmlns:a16="http://schemas.microsoft.com/office/drawing/2014/main" val="10001"/>
                   </a:ext>
                 </a:extLst>
               </a:tr>
@@ -21235,7 +21340,7 @@
                 </a:tc>
                 <a:extLst>
                   <a:ext uri="{0D108BD9-81ED-4DB2-BD59-A6C34878D82A}">
-                    <a16:rowId xmlns:a16="http://schemas.microsoft.com/office/drawing/2014/main" xmlns="" val="10002"/>
+                    <a16:rowId xmlns:a16="http://schemas.microsoft.com/office/drawing/2014/main" val="10002"/>
                   </a:ext>
                 </a:extLst>
               </a:tr>
@@ -21299,7 +21404,7 @@
                 </a:tc>
                 <a:extLst>
                   <a:ext uri="{0D108BD9-81ED-4DB2-BD59-A6C34878D82A}">
-                    <a16:rowId xmlns:a16="http://schemas.microsoft.com/office/drawing/2014/main" xmlns="" val="10003"/>
+                    <a16:rowId xmlns:a16="http://schemas.microsoft.com/office/drawing/2014/main" val="10003"/>
                   </a:ext>
                 </a:extLst>
               </a:tr>
@@ -22905,12 +23010,6 @@
 </file>
 
 <file path=customXml/item1.xml><?xml version="1.0" encoding="utf-8"?>
-<p:properties xmlns:p="http://schemas.microsoft.com/office/2006/metadata/properties" xmlns:xsi="http://www.w3.org/2001/XMLSchema-instance" xmlns:pc="http://schemas.microsoft.com/office/infopath/2007/PartnerControls">
-  <documentManagement/>
-</p:properties>
-</file>
-
-<file path=customXml/item2.xml><?xml version="1.0" encoding="utf-8"?>
 <ct:contentTypeSchema xmlns:ct="http://schemas.microsoft.com/office/2006/metadata/contentType" xmlns:ma="http://schemas.microsoft.com/office/2006/metadata/properties/metaAttributes" ct:_="" ma:_="" ma:contentTypeName="Document" ma:contentTypeID="0x010100BD9BF63586D9884E9335F37127EABBE8" ma:contentTypeVersion="1" ma:contentTypeDescription="Create a new document." ma:contentTypeScope="" ma:versionID="3b40c7f62b06f9f0cd473a069af3a91f">
   <xsd:schema xmlns:xsd="http://www.w3.org/2001/XMLSchema" xmlns:xs="http://www.w3.org/2001/XMLSchema" xmlns:p="http://schemas.microsoft.com/office/2006/metadata/properties" xmlns:ns3="e5a13ba8-98e3-4f23-a221-7ac9824aa662" targetNamespace="http://schemas.microsoft.com/office/2006/metadata/properties" ma:root="true" ma:fieldsID="4327d685be69599737fa0038b3ab671f" ns3:_="">
     <xsd:import namespace="e5a13ba8-98e3-4f23-a221-7ac9824aa662"/>
@@ -23050,6 +23149,12 @@
 </ct:contentTypeSchema>
 </file>
 
+<file path=customXml/item2.xml><?xml version="1.0" encoding="utf-8"?>
+<p:properties xmlns:p="http://schemas.microsoft.com/office/2006/metadata/properties" xmlns:xsi="http://www.w3.org/2001/XMLSchema-instance" xmlns:pc="http://schemas.microsoft.com/office/infopath/2007/PartnerControls">
+  <documentManagement/>
+</p:properties>
+</file>
+
 <file path=customXml/item3.xml><?xml version="1.0" encoding="utf-8"?>
 <?mso-contentType ?>
 <FormTemplates xmlns="http://schemas.microsoft.com/sharepoint/v3/contenttype/forms">
@@ -23060,22 +23165,6 @@
 </file>
 
 <file path=customXml/itemProps1.xml><?xml version="1.0" encoding="utf-8"?>
-<ds:datastoreItem xmlns:ds="http://schemas.openxmlformats.org/officeDocument/2006/customXml" ds:itemID="{7025FDD9-4C58-4084-9F89-0E6ADD6FFF55}">
-  <ds:schemaRefs>
-    <ds:schemaRef ds:uri="http://purl.org/dc/dcmitype/"/>
-    <ds:schemaRef ds:uri="http://purl.org/dc/elements/1.1/"/>
-    <ds:schemaRef ds:uri="http://schemas.microsoft.com/office/infopath/2007/PartnerControls"/>
-    <ds:schemaRef ds:uri="http://schemas.microsoft.com/office/2006/metadata/properties"/>
-    <ds:schemaRef ds:uri="http://schemas.microsoft.com/office/2006/documentManagement/types"/>
-    <ds:schemaRef ds:uri="http://schemas.openxmlformats.org/package/2006/metadata/core-properties"/>
-    <ds:schemaRef ds:uri="e5a13ba8-98e3-4f23-a221-7ac9824aa662"/>
-    <ds:schemaRef ds:uri="http://www.w3.org/XML/1998/namespace"/>
-    <ds:schemaRef ds:uri="http://purl.org/dc/terms/"/>
-  </ds:schemaRefs>
-</ds:datastoreItem>
-</file>
-
-<file path=customXml/itemProps2.xml><?xml version="1.0" encoding="utf-8"?>
 <ds:datastoreItem xmlns:ds="http://schemas.openxmlformats.org/officeDocument/2006/customXml" ds:itemID="{DABDB566-B5C0-42A7-A33C-2648D176B99D}">
   <ds:schemaRefs>
     <ds:schemaRef ds:uri="http://schemas.microsoft.com/office/2006/metadata/contentType"/>
@@ -23093,6 +23182,22 @@
 </ds:datastoreItem>
 </file>
 
+<file path=customXml/itemProps2.xml><?xml version="1.0" encoding="utf-8"?>
+<ds:datastoreItem xmlns:ds="http://schemas.openxmlformats.org/officeDocument/2006/customXml" ds:itemID="{7025FDD9-4C58-4084-9F89-0E6ADD6FFF55}">
+  <ds:schemaRefs>
+    <ds:schemaRef ds:uri="http://purl.org/dc/dcmitype/"/>
+    <ds:schemaRef ds:uri="http://purl.org/dc/elements/1.1/"/>
+    <ds:schemaRef ds:uri="http://schemas.microsoft.com/office/infopath/2007/PartnerControls"/>
+    <ds:schemaRef ds:uri="http://schemas.microsoft.com/office/2006/metadata/properties"/>
+    <ds:schemaRef ds:uri="http://schemas.microsoft.com/office/2006/documentManagement/types"/>
+    <ds:schemaRef ds:uri="http://schemas.openxmlformats.org/package/2006/metadata/core-properties"/>
+    <ds:schemaRef ds:uri="e5a13ba8-98e3-4f23-a221-7ac9824aa662"/>
+    <ds:schemaRef ds:uri="http://www.w3.org/XML/1998/namespace"/>
+    <ds:schemaRef ds:uri="http://purl.org/dc/terms/"/>
+  </ds:schemaRefs>
+</ds:datastoreItem>
+</file>
+
 <file path=customXml/itemProps3.xml><?xml version="1.0" encoding="utf-8"?>
 <ds:datastoreItem xmlns:ds="http://schemas.openxmlformats.org/officeDocument/2006/customXml" ds:itemID="{B0CA13EC-1D3C-4D6F-8D1C-E8A452CFC79A}">
   <ds:schemaRefs>

</xml_diff>